<commit_message>
torch embeddings conceptua checks
</commit_message>
<xml_diff>
--- a/Fundamentos LLMs - notas.pptx
+++ b/Fundamentos LLMs - notas.pptx
@@ -5,7 +5,7 @@
     <p:sldMasterId id="2147483648" r:id="rId1"/>
   </p:sldMasterIdLst>
   <p:notesMasterIdLst>
-    <p:notesMasterId r:id="rId11"/>
+    <p:notesMasterId r:id="rId17"/>
   </p:notesMasterIdLst>
   <p:sldIdLst>
     <p:sldId id="256" r:id="rId2"/>
@@ -17,6 +17,12 @@
     <p:sldId id="263" r:id="rId8"/>
     <p:sldId id="264" r:id="rId9"/>
     <p:sldId id="265" r:id="rId10"/>
+    <p:sldId id="266" r:id="rId11"/>
+    <p:sldId id="270" r:id="rId12"/>
+    <p:sldId id="271" r:id="rId13"/>
+    <p:sldId id="272" r:id="rId14"/>
+    <p:sldId id="273" r:id="rId15"/>
+    <p:sldId id="274" r:id="rId16"/>
   </p:sldIdLst>
   <p:sldSz cx="12192000" cy="6858000"/>
   <p:notesSz cx="6858000" cy="9144000"/>
@@ -126,9 +132,133 @@
 <file path=ppt/revisionInfo.xml><?xml version="1.0" encoding="utf-8"?>
 <p1510:revInfo xmlns:a="http://schemas.openxmlformats.org/drawingml/2006/main" xmlns:r="http://schemas.openxmlformats.org/officeDocument/2006/relationships" xmlns:p1510="http://schemas.microsoft.com/office/powerpoint/2015/10/main">
   <p1510:revLst>
-    <p1510:client id="{164C4EE9-AD3E-D749-9342-38968489C94D}" v="39" dt="2024-01-04T15:52:32.057"/>
+    <p1510:client id="{57C78E6D-457D-EA4D-8FEF-1E7F23749579}" v="1" dt="2024-01-05T13:10:39.749"/>
   </p1510:revLst>
 </p1510:revInfo>
+</file>
+
+<file path=ppt/changesInfos/changesInfo1.xml><?xml version="1.0" encoding="utf-8"?>
+<pc:chgInfo xmlns:a="http://schemas.openxmlformats.org/drawingml/2006/main" xmlns:r="http://schemas.openxmlformats.org/officeDocument/2006/relationships" xmlns:ac="http://schemas.microsoft.com/office/drawing/2013/main/command" xmlns:pc="http://schemas.microsoft.com/office/powerpoint/2013/main/command">
+  <pc:docChgLst>
+    <pc:chgData name="Germán CM" userId="0a866f0db4a55830" providerId="LiveId" clId="{57C78E6D-457D-EA4D-8FEF-1E7F23749579}"/>
+    <pc:docChg chg="custSel addSld delSld modSld">
+      <pc:chgData name="Germán CM" userId="0a866f0db4a55830" providerId="LiveId" clId="{57C78E6D-457D-EA4D-8FEF-1E7F23749579}" dt="2024-01-05T13:10:58.356" v="21" actId="14100"/>
+      <pc:docMkLst>
+        <pc:docMk/>
+      </pc:docMkLst>
+      <pc:sldChg chg="addSp modSp mod">
+        <pc:chgData name="Germán CM" userId="0a866f0db4a55830" providerId="LiveId" clId="{57C78E6D-457D-EA4D-8FEF-1E7F23749579}" dt="2024-01-05T13:10:58.356" v="21" actId="14100"/>
+        <pc:sldMkLst>
+          <pc:docMk/>
+          <pc:sldMk cId="1110858557" sldId="262"/>
+        </pc:sldMkLst>
+        <pc:picChg chg="mod">
+          <ac:chgData name="Germán CM" userId="0a866f0db4a55830" providerId="LiveId" clId="{57C78E6D-457D-EA4D-8FEF-1E7F23749579}" dt="2024-01-05T13:10:49.553" v="19" actId="1076"/>
+          <ac:picMkLst>
+            <pc:docMk/>
+            <pc:sldMk cId="1110858557" sldId="262"/>
+            <ac:picMk id="3" creationId="{C1C0A7E7-3D55-3A28-3903-EEB2C4F1E4C4}"/>
+          </ac:picMkLst>
+        </pc:picChg>
+        <pc:picChg chg="add mod">
+          <ac:chgData name="Germán CM" userId="0a866f0db4a55830" providerId="LiveId" clId="{57C78E6D-457D-EA4D-8FEF-1E7F23749579}" dt="2024-01-05T13:10:58.356" v="21" actId="14100"/>
+          <ac:picMkLst>
+            <pc:docMk/>
+            <pc:sldMk cId="1110858557" sldId="262"/>
+            <ac:picMk id="4" creationId="{118C9036-9B6E-1332-76D9-F1269F97A5C9}"/>
+          </ac:picMkLst>
+        </pc:picChg>
+      </pc:sldChg>
+      <pc:sldChg chg="delSp new mod">
+        <pc:chgData name="Germán CM" userId="0a866f0db4a55830" providerId="LiveId" clId="{57C78E6D-457D-EA4D-8FEF-1E7F23749579}" dt="2024-01-05T10:26:53.841" v="6" actId="478"/>
+        <pc:sldMkLst>
+          <pc:docMk/>
+          <pc:sldMk cId="1669565517" sldId="266"/>
+        </pc:sldMkLst>
+        <pc:spChg chg="del">
+          <ac:chgData name="Germán CM" userId="0a866f0db4a55830" providerId="LiveId" clId="{57C78E6D-457D-EA4D-8FEF-1E7F23749579}" dt="2024-01-05T10:26:49.734" v="4" actId="478"/>
+          <ac:spMkLst>
+            <pc:docMk/>
+            <pc:sldMk cId="1669565517" sldId="266"/>
+            <ac:spMk id="2" creationId="{62F1678F-BD26-6C73-6AEC-B93585D9DD4A}"/>
+          </ac:spMkLst>
+        </pc:spChg>
+        <pc:spChg chg="del">
+          <ac:chgData name="Germán CM" userId="0a866f0db4a55830" providerId="LiveId" clId="{57C78E6D-457D-EA4D-8FEF-1E7F23749579}" dt="2024-01-05T10:26:51.524" v="5" actId="478"/>
+          <ac:spMkLst>
+            <pc:docMk/>
+            <pc:sldMk cId="1669565517" sldId="266"/>
+            <ac:spMk id="3" creationId="{40763599-1A75-51C3-4A72-5682714F015C}"/>
+          </ac:spMkLst>
+        </pc:spChg>
+        <pc:spChg chg="del">
+          <ac:chgData name="Germán CM" userId="0a866f0db4a55830" providerId="LiveId" clId="{57C78E6D-457D-EA4D-8FEF-1E7F23749579}" dt="2024-01-05T10:26:53.841" v="6" actId="478"/>
+          <ac:spMkLst>
+            <pc:docMk/>
+            <pc:sldMk cId="1669565517" sldId="266"/>
+            <ac:spMk id="4" creationId="{1C729AEB-81D3-3CFC-03DB-BEFD51113D55}"/>
+          </ac:spMkLst>
+        </pc:spChg>
+      </pc:sldChg>
+      <pc:sldChg chg="add del mod modShow">
+        <pc:chgData name="Germán CM" userId="0a866f0db4a55830" providerId="LiveId" clId="{57C78E6D-457D-EA4D-8FEF-1E7F23749579}" dt="2024-01-05T10:27:19.575" v="13" actId="2696"/>
+        <pc:sldMkLst>
+          <pc:docMk/>
+          <pc:sldMk cId="802326155" sldId="267"/>
+        </pc:sldMkLst>
+      </pc:sldChg>
+      <pc:sldChg chg="add del">
+        <pc:chgData name="Germán CM" userId="0a866f0db4a55830" providerId="LiveId" clId="{57C78E6D-457D-EA4D-8FEF-1E7F23749579}" dt="2024-01-05T10:27:22.842" v="14" actId="2696"/>
+        <pc:sldMkLst>
+          <pc:docMk/>
+          <pc:sldMk cId="2908845890" sldId="268"/>
+        </pc:sldMkLst>
+      </pc:sldChg>
+      <pc:sldChg chg="add del">
+        <pc:chgData name="Germán CM" userId="0a866f0db4a55830" providerId="LiveId" clId="{57C78E6D-457D-EA4D-8FEF-1E7F23749579}" dt="2024-01-05T10:27:25.920" v="15" actId="2696"/>
+        <pc:sldMkLst>
+          <pc:docMk/>
+          <pc:sldMk cId="722362201" sldId="269"/>
+        </pc:sldMkLst>
+      </pc:sldChg>
+      <pc:sldChg chg="add">
+        <pc:chgData name="Germán CM" userId="0a866f0db4a55830" providerId="LiveId" clId="{57C78E6D-457D-EA4D-8FEF-1E7F23749579}" dt="2024-01-05T10:26:56.600" v="7" actId="2890"/>
+        <pc:sldMkLst>
+          <pc:docMk/>
+          <pc:sldMk cId="2661757542" sldId="270"/>
+        </pc:sldMkLst>
+      </pc:sldChg>
+      <pc:sldChg chg="add">
+        <pc:chgData name="Germán CM" userId="0a866f0db4a55830" providerId="LiveId" clId="{57C78E6D-457D-EA4D-8FEF-1E7F23749579}" dt="2024-01-05T10:26:57.477" v="8" actId="2890"/>
+        <pc:sldMkLst>
+          <pc:docMk/>
+          <pc:sldMk cId="3633654937" sldId="271"/>
+        </pc:sldMkLst>
+      </pc:sldChg>
+      <pc:sldChg chg="add">
+        <pc:chgData name="Germán CM" userId="0a866f0db4a55830" providerId="LiveId" clId="{57C78E6D-457D-EA4D-8FEF-1E7F23749579}" dt="2024-01-05T10:26:57.857" v="9" actId="2890"/>
+        <pc:sldMkLst>
+          <pc:docMk/>
+          <pc:sldMk cId="432197474" sldId="272"/>
+        </pc:sldMkLst>
+      </pc:sldChg>
+      <pc:sldChg chg="add">
+        <pc:chgData name="Germán CM" userId="0a866f0db4a55830" providerId="LiveId" clId="{57C78E6D-457D-EA4D-8FEF-1E7F23749579}" dt="2024-01-05T10:26:59.545" v="10" actId="2890"/>
+        <pc:sldMkLst>
+          <pc:docMk/>
+          <pc:sldMk cId="3153991101" sldId="273"/>
+        </pc:sldMkLst>
+      </pc:sldChg>
+      <pc:sldChg chg="add">
+        <pc:chgData name="Germán CM" userId="0a866f0db4a55830" providerId="LiveId" clId="{57C78E6D-457D-EA4D-8FEF-1E7F23749579}" dt="2024-01-05T10:26:59.663" v="11" actId="2890"/>
+        <pc:sldMkLst>
+          <pc:docMk/>
+          <pc:sldMk cId="3703038104" sldId="274"/>
+        </pc:sldMkLst>
+      </pc:sldChg>
+    </pc:docChg>
+  </pc:docChgLst>
+</pc:chgInfo>
 </file>
 
 <file path=ppt/ink/ink1.xml><?xml version="1.0" encoding="utf-8"?>
@@ -6814,6 +6944,360 @@
     <p:extLst>
       <p:ext uri="{BB962C8B-B14F-4D97-AF65-F5344CB8AC3E}">
         <p14:creationId xmlns:p14="http://schemas.microsoft.com/office/powerpoint/2010/main" val="3771015730"/>
+      </p:ext>
+    </p:extLst>
+  </p:cSld>
+  <p:clrMapOvr>
+    <a:masterClrMapping/>
+  </p:clrMapOvr>
+</p:sld>
+</file>
+
+<file path=ppt/slides/slide10.xml><?xml version="1.0" encoding="utf-8"?>
+<p:sld xmlns:a="http://schemas.openxmlformats.org/drawingml/2006/main" xmlns:r="http://schemas.openxmlformats.org/officeDocument/2006/relationships" xmlns:p="http://schemas.openxmlformats.org/presentationml/2006/main">
+  <p:cSld>
+    <p:spTree>
+      <p:nvGrpSpPr>
+        <p:cNvPr id="1" name=""/>
+        <p:cNvGrpSpPr/>
+        <p:nvPr/>
+      </p:nvGrpSpPr>
+      <p:grpSpPr>
+        <a:xfrm>
+          <a:off x="0" y="0"/>
+          <a:ext cx="0" cy="0"/>
+          <a:chOff x="0" y="0"/>
+          <a:chExt cx="0" cy="0"/>
+        </a:xfrm>
+      </p:grpSpPr>
+      <p:sp>
+        <p:nvSpPr>
+          <p:cNvPr id="5" name="Marcador de número de diapositiva 4">
+            <a:extLst>
+              <a:ext uri="{FF2B5EF4-FFF2-40B4-BE49-F238E27FC236}">
+                <a16:creationId xmlns:a16="http://schemas.microsoft.com/office/drawing/2014/main" id="{CD934C94-1295-9720-A4C4-D6F085238A89}"/>
+              </a:ext>
+            </a:extLst>
+          </p:cNvPr>
+          <p:cNvSpPr>
+            <a:spLocks noGrp="1"/>
+          </p:cNvSpPr>
+          <p:nvPr>
+            <p:ph type="sldNum" sz="quarter" idx="12"/>
+          </p:nvPr>
+        </p:nvSpPr>
+        <p:spPr/>
+        <p:txBody>
+          <a:bodyPr/>
+          <a:lstStyle/>
+          <a:p>
+            <a:fld id="{E1BF4B5F-C7C2-9E4B-90D7-6F404CF8882D}" type="slidenum">
+              <a:rPr lang="es-ES" smtClean="0"/>
+              <a:t>10</a:t>
+            </a:fld>
+            <a:endParaRPr lang="es-ES"/>
+          </a:p>
+        </p:txBody>
+      </p:sp>
+    </p:spTree>
+    <p:extLst>
+      <p:ext uri="{BB962C8B-B14F-4D97-AF65-F5344CB8AC3E}">
+        <p14:creationId xmlns:p14="http://schemas.microsoft.com/office/powerpoint/2010/main" val="1669565517"/>
+      </p:ext>
+    </p:extLst>
+  </p:cSld>
+  <p:clrMapOvr>
+    <a:masterClrMapping/>
+  </p:clrMapOvr>
+</p:sld>
+</file>
+
+<file path=ppt/slides/slide11.xml><?xml version="1.0" encoding="utf-8"?>
+<p:sld xmlns:a="http://schemas.openxmlformats.org/drawingml/2006/main" xmlns:r="http://schemas.openxmlformats.org/officeDocument/2006/relationships" xmlns:p="http://schemas.openxmlformats.org/presentationml/2006/main">
+  <p:cSld>
+    <p:spTree>
+      <p:nvGrpSpPr>
+        <p:cNvPr id="1" name=""/>
+        <p:cNvGrpSpPr/>
+        <p:nvPr/>
+      </p:nvGrpSpPr>
+      <p:grpSpPr>
+        <a:xfrm>
+          <a:off x="0" y="0"/>
+          <a:ext cx="0" cy="0"/>
+          <a:chOff x="0" y="0"/>
+          <a:chExt cx="0" cy="0"/>
+        </a:xfrm>
+      </p:grpSpPr>
+      <p:sp>
+        <p:nvSpPr>
+          <p:cNvPr id="5" name="Marcador de número de diapositiva 4">
+            <a:extLst>
+              <a:ext uri="{FF2B5EF4-FFF2-40B4-BE49-F238E27FC236}">
+                <a16:creationId xmlns:a16="http://schemas.microsoft.com/office/drawing/2014/main" id="{CD934C94-1295-9720-A4C4-D6F085238A89}"/>
+              </a:ext>
+            </a:extLst>
+          </p:cNvPr>
+          <p:cNvSpPr>
+            <a:spLocks noGrp="1"/>
+          </p:cNvSpPr>
+          <p:nvPr>
+            <p:ph type="sldNum" sz="quarter" idx="12"/>
+          </p:nvPr>
+        </p:nvSpPr>
+        <p:spPr/>
+        <p:txBody>
+          <a:bodyPr/>
+          <a:lstStyle/>
+          <a:p>
+            <a:fld id="{E1BF4B5F-C7C2-9E4B-90D7-6F404CF8882D}" type="slidenum">
+              <a:rPr lang="es-ES" smtClean="0"/>
+              <a:t>11</a:t>
+            </a:fld>
+            <a:endParaRPr lang="es-ES"/>
+          </a:p>
+        </p:txBody>
+      </p:sp>
+    </p:spTree>
+    <p:extLst>
+      <p:ext uri="{BB962C8B-B14F-4D97-AF65-F5344CB8AC3E}">
+        <p14:creationId xmlns:p14="http://schemas.microsoft.com/office/powerpoint/2010/main" val="2661757542"/>
+      </p:ext>
+    </p:extLst>
+  </p:cSld>
+  <p:clrMapOvr>
+    <a:masterClrMapping/>
+  </p:clrMapOvr>
+</p:sld>
+</file>
+
+<file path=ppt/slides/slide12.xml><?xml version="1.0" encoding="utf-8"?>
+<p:sld xmlns:a="http://schemas.openxmlformats.org/drawingml/2006/main" xmlns:r="http://schemas.openxmlformats.org/officeDocument/2006/relationships" xmlns:p="http://schemas.openxmlformats.org/presentationml/2006/main">
+  <p:cSld>
+    <p:spTree>
+      <p:nvGrpSpPr>
+        <p:cNvPr id="1" name=""/>
+        <p:cNvGrpSpPr/>
+        <p:nvPr/>
+      </p:nvGrpSpPr>
+      <p:grpSpPr>
+        <a:xfrm>
+          <a:off x="0" y="0"/>
+          <a:ext cx="0" cy="0"/>
+          <a:chOff x="0" y="0"/>
+          <a:chExt cx="0" cy="0"/>
+        </a:xfrm>
+      </p:grpSpPr>
+      <p:sp>
+        <p:nvSpPr>
+          <p:cNvPr id="5" name="Marcador de número de diapositiva 4">
+            <a:extLst>
+              <a:ext uri="{FF2B5EF4-FFF2-40B4-BE49-F238E27FC236}">
+                <a16:creationId xmlns:a16="http://schemas.microsoft.com/office/drawing/2014/main" id="{CD934C94-1295-9720-A4C4-D6F085238A89}"/>
+              </a:ext>
+            </a:extLst>
+          </p:cNvPr>
+          <p:cNvSpPr>
+            <a:spLocks noGrp="1"/>
+          </p:cNvSpPr>
+          <p:nvPr>
+            <p:ph type="sldNum" sz="quarter" idx="12"/>
+          </p:nvPr>
+        </p:nvSpPr>
+        <p:spPr/>
+        <p:txBody>
+          <a:bodyPr/>
+          <a:lstStyle/>
+          <a:p>
+            <a:fld id="{E1BF4B5F-C7C2-9E4B-90D7-6F404CF8882D}" type="slidenum">
+              <a:rPr lang="es-ES" smtClean="0"/>
+              <a:t>12</a:t>
+            </a:fld>
+            <a:endParaRPr lang="es-ES"/>
+          </a:p>
+        </p:txBody>
+      </p:sp>
+    </p:spTree>
+    <p:extLst>
+      <p:ext uri="{BB962C8B-B14F-4D97-AF65-F5344CB8AC3E}">
+        <p14:creationId xmlns:p14="http://schemas.microsoft.com/office/powerpoint/2010/main" val="3633654937"/>
+      </p:ext>
+    </p:extLst>
+  </p:cSld>
+  <p:clrMapOvr>
+    <a:masterClrMapping/>
+  </p:clrMapOvr>
+</p:sld>
+</file>
+
+<file path=ppt/slides/slide13.xml><?xml version="1.0" encoding="utf-8"?>
+<p:sld xmlns:a="http://schemas.openxmlformats.org/drawingml/2006/main" xmlns:r="http://schemas.openxmlformats.org/officeDocument/2006/relationships" xmlns:p="http://schemas.openxmlformats.org/presentationml/2006/main">
+  <p:cSld>
+    <p:spTree>
+      <p:nvGrpSpPr>
+        <p:cNvPr id="1" name=""/>
+        <p:cNvGrpSpPr/>
+        <p:nvPr/>
+      </p:nvGrpSpPr>
+      <p:grpSpPr>
+        <a:xfrm>
+          <a:off x="0" y="0"/>
+          <a:ext cx="0" cy="0"/>
+          <a:chOff x="0" y="0"/>
+          <a:chExt cx="0" cy="0"/>
+        </a:xfrm>
+      </p:grpSpPr>
+      <p:sp>
+        <p:nvSpPr>
+          <p:cNvPr id="5" name="Marcador de número de diapositiva 4">
+            <a:extLst>
+              <a:ext uri="{FF2B5EF4-FFF2-40B4-BE49-F238E27FC236}">
+                <a16:creationId xmlns:a16="http://schemas.microsoft.com/office/drawing/2014/main" id="{CD934C94-1295-9720-A4C4-D6F085238A89}"/>
+              </a:ext>
+            </a:extLst>
+          </p:cNvPr>
+          <p:cNvSpPr>
+            <a:spLocks noGrp="1"/>
+          </p:cNvSpPr>
+          <p:nvPr>
+            <p:ph type="sldNum" sz="quarter" idx="12"/>
+          </p:nvPr>
+        </p:nvSpPr>
+        <p:spPr/>
+        <p:txBody>
+          <a:bodyPr/>
+          <a:lstStyle/>
+          <a:p>
+            <a:fld id="{E1BF4B5F-C7C2-9E4B-90D7-6F404CF8882D}" type="slidenum">
+              <a:rPr lang="es-ES" smtClean="0"/>
+              <a:t>13</a:t>
+            </a:fld>
+            <a:endParaRPr lang="es-ES"/>
+          </a:p>
+        </p:txBody>
+      </p:sp>
+    </p:spTree>
+    <p:extLst>
+      <p:ext uri="{BB962C8B-B14F-4D97-AF65-F5344CB8AC3E}">
+        <p14:creationId xmlns:p14="http://schemas.microsoft.com/office/powerpoint/2010/main" val="432197474"/>
+      </p:ext>
+    </p:extLst>
+  </p:cSld>
+  <p:clrMapOvr>
+    <a:masterClrMapping/>
+  </p:clrMapOvr>
+</p:sld>
+</file>
+
+<file path=ppt/slides/slide14.xml><?xml version="1.0" encoding="utf-8"?>
+<p:sld xmlns:a="http://schemas.openxmlformats.org/drawingml/2006/main" xmlns:r="http://schemas.openxmlformats.org/officeDocument/2006/relationships" xmlns:p="http://schemas.openxmlformats.org/presentationml/2006/main">
+  <p:cSld>
+    <p:spTree>
+      <p:nvGrpSpPr>
+        <p:cNvPr id="1" name=""/>
+        <p:cNvGrpSpPr/>
+        <p:nvPr/>
+      </p:nvGrpSpPr>
+      <p:grpSpPr>
+        <a:xfrm>
+          <a:off x="0" y="0"/>
+          <a:ext cx="0" cy="0"/>
+          <a:chOff x="0" y="0"/>
+          <a:chExt cx="0" cy="0"/>
+        </a:xfrm>
+      </p:grpSpPr>
+      <p:sp>
+        <p:nvSpPr>
+          <p:cNvPr id="5" name="Marcador de número de diapositiva 4">
+            <a:extLst>
+              <a:ext uri="{FF2B5EF4-FFF2-40B4-BE49-F238E27FC236}">
+                <a16:creationId xmlns:a16="http://schemas.microsoft.com/office/drawing/2014/main" id="{CD934C94-1295-9720-A4C4-D6F085238A89}"/>
+              </a:ext>
+            </a:extLst>
+          </p:cNvPr>
+          <p:cNvSpPr>
+            <a:spLocks noGrp="1"/>
+          </p:cNvSpPr>
+          <p:nvPr>
+            <p:ph type="sldNum" sz="quarter" idx="12"/>
+          </p:nvPr>
+        </p:nvSpPr>
+        <p:spPr/>
+        <p:txBody>
+          <a:bodyPr/>
+          <a:lstStyle/>
+          <a:p>
+            <a:fld id="{E1BF4B5F-C7C2-9E4B-90D7-6F404CF8882D}" type="slidenum">
+              <a:rPr lang="es-ES" smtClean="0"/>
+              <a:t>14</a:t>
+            </a:fld>
+            <a:endParaRPr lang="es-ES"/>
+          </a:p>
+        </p:txBody>
+      </p:sp>
+    </p:spTree>
+    <p:extLst>
+      <p:ext uri="{BB962C8B-B14F-4D97-AF65-F5344CB8AC3E}">
+        <p14:creationId xmlns:p14="http://schemas.microsoft.com/office/powerpoint/2010/main" val="3153991101"/>
+      </p:ext>
+    </p:extLst>
+  </p:cSld>
+  <p:clrMapOvr>
+    <a:masterClrMapping/>
+  </p:clrMapOvr>
+</p:sld>
+</file>
+
+<file path=ppt/slides/slide15.xml><?xml version="1.0" encoding="utf-8"?>
+<p:sld xmlns:a="http://schemas.openxmlformats.org/drawingml/2006/main" xmlns:r="http://schemas.openxmlformats.org/officeDocument/2006/relationships" xmlns:p="http://schemas.openxmlformats.org/presentationml/2006/main">
+  <p:cSld>
+    <p:spTree>
+      <p:nvGrpSpPr>
+        <p:cNvPr id="1" name=""/>
+        <p:cNvGrpSpPr/>
+        <p:nvPr/>
+      </p:nvGrpSpPr>
+      <p:grpSpPr>
+        <a:xfrm>
+          <a:off x="0" y="0"/>
+          <a:ext cx="0" cy="0"/>
+          <a:chOff x="0" y="0"/>
+          <a:chExt cx="0" cy="0"/>
+        </a:xfrm>
+      </p:grpSpPr>
+      <p:sp>
+        <p:nvSpPr>
+          <p:cNvPr id="5" name="Marcador de número de diapositiva 4">
+            <a:extLst>
+              <a:ext uri="{FF2B5EF4-FFF2-40B4-BE49-F238E27FC236}">
+                <a16:creationId xmlns:a16="http://schemas.microsoft.com/office/drawing/2014/main" id="{CD934C94-1295-9720-A4C4-D6F085238A89}"/>
+              </a:ext>
+            </a:extLst>
+          </p:cNvPr>
+          <p:cNvSpPr>
+            <a:spLocks noGrp="1"/>
+          </p:cNvSpPr>
+          <p:nvPr>
+            <p:ph type="sldNum" sz="quarter" idx="12"/>
+          </p:nvPr>
+        </p:nvSpPr>
+        <p:spPr/>
+        <p:txBody>
+          <a:bodyPr/>
+          <a:lstStyle/>
+          <a:p>
+            <a:fld id="{E1BF4B5F-C7C2-9E4B-90D7-6F404CF8882D}" type="slidenum">
+              <a:rPr lang="es-ES" smtClean="0"/>
+              <a:t>15</a:t>
+            </a:fld>
+            <a:endParaRPr lang="es-ES"/>
+          </a:p>
+        </p:txBody>
+      </p:sp>
+    </p:spTree>
+    <p:extLst>
+      <p:ext uri="{BB962C8B-B14F-4D97-AF65-F5344CB8AC3E}">
+        <p14:creationId xmlns:p14="http://schemas.microsoft.com/office/powerpoint/2010/main" val="3703038104"/>
       </p:ext>
     </p:extLst>
   </p:cSld>
@@ -11795,8 +12279,8 @@
         </p:blipFill>
         <p:spPr>
           <a:xfrm>
-            <a:off x="5507635" y="230360"/>
-            <a:ext cx="6448411" cy="6125990"/>
+            <a:off x="6216392" y="1538701"/>
+            <a:ext cx="5137408" cy="4880537"/>
           </a:xfrm>
           <a:prstGeom prst="rect">
             <a:avLst/>
@@ -11849,6 +12333,36 @@
           </a:p>
         </p:txBody>
       </p:sp>
+      <p:pic>
+        <p:nvPicPr>
+          <p:cNvPr id="4" name="Imagen 3">
+            <a:extLst>
+              <a:ext uri="{FF2B5EF4-FFF2-40B4-BE49-F238E27FC236}">
+                <a16:creationId xmlns:a16="http://schemas.microsoft.com/office/drawing/2014/main" id="{118C9036-9B6E-1332-76D9-F1269F97A5C9}"/>
+              </a:ext>
+            </a:extLst>
+          </p:cNvPr>
+          <p:cNvPicPr>
+            <a:picLocks noChangeAspect="1"/>
+          </p:cNvPicPr>
+          <p:nvPr/>
+        </p:nvPicPr>
+        <p:blipFill>
+          <a:blip r:embed="rId3"/>
+          <a:stretch>
+            <a:fillRect/>
+          </a:stretch>
+        </p:blipFill>
+        <p:spPr>
+          <a:xfrm>
+            <a:off x="5098839" y="74196"/>
+            <a:ext cx="6996775" cy="1251568"/>
+          </a:xfrm>
+          <a:prstGeom prst="rect">
+            <a:avLst/>
+          </a:prstGeom>
+        </p:spPr>
+      </p:pic>
     </p:spTree>
     <p:extLst>
       <p:ext uri="{BB962C8B-B14F-4D97-AF65-F5344CB8AC3E}">

</xml_diff>